<commit_message>
more work on analyses and such
</commit_message>
<xml_diff>
--- a/Figures/figure_making.pptx
+++ b/Figures/figure_making.pptx
@@ -105,6 +105,11 @@
       </a:defRPr>
     </a:lvl9pPr>
   </p:defaultTextStyle>
+  <p:extLst>
+    <p:ext uri="{EFAFB233-063F-42B5-8137-9DF3F51BA10A}">
+      <p15:sldGuideLst xmlns:p15="http://schemas.microsoft.com/office/powerpoint/2012/main"/>
+    </p:ext>
+  </p:extLst>
 </p:presentation>
 </file>
 
@@ -255,7 +260,7 @@
           <a:p>
             <a:fld id="{9A0015C3-2E44-486C-A5F2-7FA6CB10593F}" type="datetimeFigureOut">
               <a:rPr lang="en-US" smtClean="0"/>
-              <a:t>8/3/2021</a:t>
+              <a:t>8/26/2021</a:t>
             </a:fld>
             <a:endParaRPr lang="en-US"/>
           </a:p>
@@ -453,7 +458,7 @@
           <a:p>
             <a:fld id="{9A0015C3-2E44-486C-A5F2-7FA6CB10593F}" type="datetimeFigureOut">
               <a:rPr lang="en-US" smtClean="0"/>
-              <a:t>8/3/2021</a:t>
+              <a:t>8/26/2021</a:t>
             </a:fld>
             <a:endParaRPr lang="en-US"/>
           </a:p>
@@ -661,7 +666,7 @@
           <a:p>
             <a:fld id="{9A0015C3-2E44-486C-A5F2-7FA6CB10593F}" type="datetimeFigureOut">
               <a:rPr lang="en-US" smtClean="0"/>
-              <a:t>8/3/2021</a:t>
+              <a:t>8/26/2021</a:t>
             </a:fld>
             <a:endParaRPr lang="en-US"/>
           </a:p>
@@ -859,7 +864,7 @@
           <a:p>
             <a:fld id="{9A0015C3-2E44-486C-A5F2-7FA6CB10593F}" type="datetimeFigureOut">
               <a:rPr lang="en-US" smtClean="0"/>
-              <a:t>8/3/2021</a:t>
+              <a:t>8/26/2021</a:t>
             </a:fld>
             <a:endParaRPr lang="en-US"/>
           </a:p>
@@ -1134,7 +1139,7 @@
           <a:p>
             <a:fld id="{9A0015C3-2E44-486C-A5F2-7FA6CB10593F}" type="datetimeFigureOut">
               <a:rPr lang="en-US" smtClean="0"/>
-              <a:t>8/3/2021</a:t>
+              <a:t>8/26/2021</a:t>
             </a:fld>
             <a:endParaRPr lang="en-US"/>
           </a:p>
@@ -1399,7 +1404,7 @@
           <a:p>
             <a:fld id="{9A0015C3-2E44-486C-A5F2-7FA6CB10593F}" type="datetimeFigureOut">
               <a:rPr lang="en-US" smtClean="0"/>
-              <a:t>8/3/2021</a:t>
+              <a:t>8/26/2021</a:t>
             </a:fld>
             <a:endParaRPr lang="en-US"/>
           </a:p>
@@ -1811,7 +1816,7 @@
           <a:p>
             <a:fld id="{9A0015C3-2E44-486C-A5F2-7FA6CB10593F}" type="datetimeFigureOut">
               <a:rPr lang="en-US" smtClean="0"/>
-              <a:t>8/3/2021</a:t>
+              <a:t>8/26/2021</a:t>
             </a:fld>
             <a:endParaRPr lang="en-US"/>
           </a:p>
@@ -1952,7 +1957,7 @@
           <a:p>
             <a:fld id="{9A0015C3-2E44-486C-A5F2-7FA6CB10593F}" type="datetimeFigureOut">
               <a:rPr lang="en-US" smtClean="0"/>
-              <a:t>8/3/2021</a:t>
+              <a:t>8/26/2021</a:t>
             </a:fld>
             <a:endParaRPr lang="en-US"/>
           </a:p>
@@ -2065,7 +2070,7 @@
           <a:p>
             <a:fld id="{9A0015C3-2E44-486C-A5F2-7FA6CB10593F}" type="datetimeFigureOut">
               <a:rPr lang="en-US" smtClean="0"/>
-              <a:t>8/3/2021</a:t>
+              <a:t>8/26/2021</a:t>
             </a:fld>
             <a:endParaRPr lang="en-US"/>
           </a:p>
@@ -2376,7 +2381,7 @@
           <a:p>
             <a:fld id="{9A0015C3-2E44-486C-A5F2-7FA6CB10593F}" type="datetimeFigureOut">
               <a:rPr lang="en-US" smtClean="0"/>
-              <a:t>8/3/2021</a:t>
+              <a:t>8/26/2021</a:t>
             </a:fld>
             <a:endParaRPr lang="en-US"/>
           </a:p>
@@ -2664,7 +2669,7 @@
           <a:p>
             <a:fld id="{9A0015C3-2E44-486C-A5F2-7FA6CB10593F}" type="datetimeFigureOut">
               <a:rPr lang="en-US" smtClean="0"/>
-              <a:t>8/3/2021</a:t>
+              <a:t>8/26/2021</a:t>
             </a:fld>
             <a:endParaRPr lang="en-US"/>
           </a:p>
@@ -2905,7 +2910,7 @@
           <a:p>
             <a:fld id="{9A0015C3-2E44-486C-A5F2-7FA6CB10593F}" type="datetimeFigureOut">
               <a:rPr lang="en-US" smtClean="0"/>
-              <a:t>8/3/2021</a:t>
+              <a:t>8/26/2021</a:t>
             </a:fld>
             <a:endParaRPr lang="en-US"/>
           </a:p>
@@ -3566,10 +3571,10 @@
       </p:grpSpPr>
       <p:pic>
         <p:nvPicPr>
-          <p:cNvPr id="3" name="Picture 2">
-            <a:extLst>
-              <a:ext uri="{FF2B5EF4-FFF2-40B4-BE49-F238E27FC236}">
-                <a16:creationId xmlns:a16="http://schemas.microsoft.com/office/drawing/2014/main" id="{56C57B6E-12E3-4111-8C48-692FFEB2AE77}"/>
+          <p:cNvPr id="8" name="Picture 7">
+            <a:extLst>
+              <a:ext uri="{FF2B5EF4-FFF2-40B4-BE49-F238E27FC236}">
+                <a16:creationId xmlns:a16="http://schemas.microsoft.com/office/drawing/2014/main" id="{FE995C2F-8A20-4F58-B0E4-E2AC0B3EB43E}"/>
               </a:ext>
             </a:extLst>
           </p:cNvPr>
@@ -3586,13 +3591,13 @@
               </a:ext>
             </a:extLst>
           </a:blip>
-          <a:srcRect t="15254" b="17096"/>
+          <a:srcRect t="16757" b="16757"/>
           <a:stretch/>
         </p:blipFill>
         <p:spPr>
           <a:xfrm>
-            <a:off x="1433126" y="58039"/>
-            <a:ext cx="9170001" cy="6131293"/>
+            <a:off x="1298059" y="157807"/>
+            <a:ext cx="9249036" cy="6077908"/>
           </a:xfrm>
           <a:prstGeom prst="rect">
             <a:avLst/>
@@ -3672,7 +3677,7 @@
         </p:blipFill>
         <p:spPr>
           <a:xfrm>
-            <a:off x="6269425" y="2767698"/>
+            <a:off x="6145632" y="2755098"/>
             <a:ext cx="442382" cy="711974"/>
           </a:xfrm>
           <a:prstGeom prst="rect">
@@ -3713,7 +3718,7 @@
         </p:blipFill>
         <p:spPr>
           <a:xfrm>
-            <a:off x="1970343" y="1319704"/>
+            <a:off x="1831477" y="1269028"/>
             <a:ext cx="1073191" cy="541979"/>
           </a:xfrm>
           <a:prstGeom prst="rect">
@@ -3754,7 +3759,7 @@
         </p:blipFill>
         <p:spPr>
           <a:xfrm rot="16200000" flipH="1">
-            <a:off x="2284894" y="2600928"/>
+            <a:off x="2215462" y="2624608"/>
             <a:ext cx="444087" cy="1212057"/>
           </a:xfrm>
           <a:prstGeom prst="rect">

</xml_diff>

<commit_message>
more work from Corey!
</commit_message>
<xml_diff>
--- a/Figures/figure_making.pptx
+++ b/Figures/figure_making.pptx
@@ -260,7 +260,7 @@
           <a:p>
             <a:fld id="{9A0015C3-2E44-486C-A5F2-7FA6CB10593F}" type="datetimeFigureOut">
               <a:rPr lang="en-US" smtClean="0"/>
-              <a:t>8/26/2021</a:t>
+              <a:t>9/21/2021</a:t>
             </a:fld>
             <a:endParaRPr lang="en-US"/>
           </a:p>
@@ -458,7 +458,7 @@
           <a:p>
             <a:fld id="{9A0015C3-2E44-486C-A5F2-7FA6CB10593F}" type="datetimeFigureOut">
               <a:rPr lang="en-US" smtClean="0"/>
-              <a:t>8/26/2021</a:t>
+              <a:t>9/21/2021</a:t>
             </a:fld>
             <a:endParaRPr lang="en-US"/>
           </a:p>
@@ -666,7 +666,7 @@
           <a:p>
             <a:fld id="{9A0015C3-2E44-486C-A5F2-7FA6CB10593F}" type="datetimeFigureOut">
               <a:rPr lang="en-US" smtClean="0"/>
-              <a:t>8/26/2021</a:t>
+              <a:t>9/21/2021</a:t>
             </a:fld>
             <a:endParaRPr lang="en-US"/>
           </a:p>
@@ -864,7 +864,7 @@
           <a:p>
             <a:fld id="{9A0015C3-2E44-486C-A5F2-7FA6CB10593F}" type="datetimeFigureOut">
               <a:rPr lang="en-US" smtClean="0"/>
-              <a:t>8/26/2021</a:t>
+              <a:t>9/21/2021</a:t>
             </a:fld>
             <a:endParaRPr lang="en-US"/>
           </a:p>
@@ -1139,7 +1139,7 @@
           <a:p>
             <a:fld id="{9A0015C3-2E44-486C-A5F2-7FA6CB10593F}" type="datetimeFigureOut">
               <a:rPr lang="en-US" smtClean="0"/>
-              <a:t>8/26/2021</a:t>
+              <a:t>9/21/2021</a:t>
             </a:fld>
             <a:endParaRPr lang="en-US"/>
           </a:p>
@@ -1404,7 +1404,7 @@
           <a:p>
             <a:fld id="{9A0015C3-2E44-486C-A5F2-7FA6CB10593F}" type="datetimeFigureOut">
               <a:rPr lang="en-US" smtClean="0"/>
-              <a:t>8/26/2021</a:t>
+              <a:t>9/21/2021</a:t>
             </a:fld>
             <a:endParaRPr lang="en-US"/>
           </a:p>
@@ -1816,7 +1816,7 @@
           <a:p>
             <a:fld id="{9A0015C3-2E44-486C-A5F2-7FA6CB10593F}" type="datetimeFigureOut">
               <a:rPr lang="en-US" smtClean="0"/>
-              <a:t>8/26/2021</a:t>
+              <a:t>9/21/2021</a:t>
             </a:fld>
             <a:endParaRPr lang="en-US"/>
           </a:p>
@@ -1957,7 +1957,7 @@
           <a:p>
             <a:fld id="{9A0015C3-2E44-486C-A5F2-7FA6CB10593F}" type="datetimeFigureOut">
               <a:rPr lang="en-US" smtClean="0"/>
-              <a:t>8/26/2021</a:t>
+              <a:t>9/21/2021</a:t>
             </a:fld>
             <a:endParaRPr lang="en-US"/>
           </a:p>
@@ -2070,7 +2070,7 @@
           <a:p>
             <a:fld id="{9A0015C3-2E44-486C-A5F2-7FA6CB10593F}" type="datetimeFigureOut">
               <a:rPr lang="en-US" smtClean="0"/>
-              <a:t>8/26/2021</a:t>
+              <a:t>9/21/2021</a:t>
             </a:fld>
             <a:endParaRPr lang="en-US"/>
           </a:p>
@@ -2381,7 +2381,7 @@
           <a:p>
             <a:fld id="{9A0015C3-2E44-486C-A5F2-7FA6CB10593F}" type="datetimeFigureOut">
               <a:rPr lang="en-US" smtClean="0"/>
-              <a:t>8/26/2021</a:t>
+              <a:t>9/21/2021</a:t>
             </a:fld>
             <a:endParaRPr lang="en-US"/>
           </a:p>
@@ -2669,7 +2669,7 @@
           <a:p>
             <a:fld id="{9A0015C3-2E44-486C-A5F2-7FA6CB10593F}" type="datetimeFigureOut">
               <a:rPr lang="en-US" smtClean="0"/>
-              <a:t>8/26/2021</a:t>
+              <a:t>9/21/2021</a:t>
             </a:fld>
             <a:endParaRPr lang="en-US"/>
           </a:p>
@@ -2910,7 +2910,7 @@
           <a:p>
             <a:fld id="{9A0015C3-2E44-486C-A5F2-7FA6CB10593F}" type="datetimeFigureOut">
               <a:rPr lang="en-US" smtClean="0"/>
-              <a:t>8/26/2021</a:t>
+              <a:t>9/21/2021</a:t>
             </a:fld>
             <a:endParaRPr lang="en-US"/>
           </a:p>
@@ -3571,10 +3571,10 @@
       </p:grpSpPr>
       <p:pic>
         <p:nvPicPr>
-          <p:cNvPr id="8" name="Picture 7">
-            <a:extLst>
-              <a:ext uri="{FF2B5EF4-FFF2-40B4-BE49-F238E27FC236}">
-                <a16:creationId xmlns:a16="http://schemas.microsoft.com/office/drawing/2014/main" id="{FE995C2F-8A20-4F58-B0E4-E2AC0B3EB43E}"/>
+          <p:cNvPr id="3" name="Picture 2">
+            <a:extLst>
+              <a:ext uri="{FF2B5EF4-FFF2-40B4-BE49-F238E27FC236}">
+                <a16:creationId xmlns:a16="http://schemas.microsoft.com/office/drawing/2014/main" id="{3B09AA8C-68E5-45C5-910B-495B7F530D51}"/>
               </a:ext>
             </a:extLst>
           </p:cNvPr>
@@ -3596,8 +3596,8 @@
         </p:blipFill>
         <p:spPr>
           <a:xfrm>
-            <a:off x="1298059" y="157807"/>
-            <a:ext cx="9249036" cy="6077908"/>
+            <a:off x="1455184" y="218162"/>
+            <a:ext cx="9157191" cy="6017553"/>
           </a:xfrm>
           <a:prstGeom prst="rect">
             <a:avLst/>
@@ -3606,10 +3606,50 @@
       </p:pic>
       <p:pic>
         <p:nvPicPr>
-          <p:cNvPr id="6" name="Picture 5">
-            <a:extLst>
-              <a:ext uri="{FF2B5EF4-FFF2-40B4-BE49-F238E27FC236}">
-                <a16:creationId xmlns:a16="http://schemas.microsoft.com/office/drawing/2014/main" id="{597F6BFC-8C63-413E-93CD-BB76FFBD0EBE}"/>
+          <p:cNvPr id="15" name="Picture 14">
+            <a:extLst>
+              <a:ext uri="{FF2B5EF4-FFF2-40B4-BE49-F238E27FC236}">
+                <a16:creationId xmlns:a16="http://schemas.microsoft.com/office/drawing/2014/main" id="{A2D7E8FA-BDA1-4B10-99E3-7A817C5A1634}"/>
+              </a:ext>
+            </a:extLst>
+          </p:cNvPr>
+          <p:cNvPicPr>
+            <a:picLocks noChangeAspect="1"/>
+          </p:cNvPicPr>
+          <p:nvPr/>
+        </p:nvPicPr>
+        <p:blipFill rotWithShape="1">
+          <a:blip r:embed="rId3">
+            <a:clrChange>
+              <a:clrFrom>
+                <a:srgbClr val="FFFFFF"/>
+              </a:clrFrom>
+              <a:clrTo>
+                <a:srgbClr val="FFFFFF">
+                  <a:alpha val="0"/>
+                </a:srgbClr>
+              </a:clrTo>
+            </a:clrChange>
+          </a:blip>
+          <a:srcRect r="10573"/>
+          <a:stretch/>
+        </p:blipFill>
+        <p:spPr>
+          <a:xfrm>
+            <a:off x="1831477" y="4382199"/>
+            <a:ext cx="442382" cy="711974"/>
+          </a:xfrm>
+          <a:prstGeom prst="rect">
+            <a:avLst/>
+          </a:prstGeom>
+        </p:spPr>
+      </p:pic>
+      <p:pic>
+        <p:nvPicPr>
+          <p:cNvPr id="16" name="Picture 15">
+            <a:extLst>
+              <a:ext uri="{FF2B5EF4-FFF2-40B4-BE49-F238E27FC236}">
+                <a16:creationId xmlns:a16="http://schemas.microsoft.com/office/drawing/2014/main" id="{40A4AFD2-34F3-46AA-9CDA-66124527A2E6}"/>
               </a:ext>
             </a:extLst>
           </p:cNvPr>
@@ -3619,7 +3659,7 @@
           <p:nvPr/>
         </p:nvPicPr>
         <p:blipFill>
-          <a:blip r:embed="rId3">
+          <a:blip r:embed="rId4">
             <a:clrChange>
               <a:clrFrom>
                 <a:srgbClr val="FFFFFF"/>
@@ -3636,9 +3676,9 @@
           </a:stretch>
         </p:blipFill>
         <p:spPr>
-          <a:xfrm flipH="1">
-            <a:off x="6269425" y="4499812"/>
-            <a:ext cx="644574" cy="531827"/>
+          <a:xfrm>
+            <a:off x="1938009" y="2934746"/>
+            <a:ext cx="1018255" cy="514235"/>
           </a:xfrm>
           <a:prstGeom prst="rect">
             <a:avLst/>
@@ -3647,50 +3687,10 @@
       </p:pic>
       <p:pic>
         <p:nvPicPr>
-          <p:cNvPr id="15" name="Picture 14">
-            <a:extLst>
-              <a:ext uri="{FF2B5EF4-FFF2-40B4-BE49-F238E27FC236}">
-                <a16:creationId xmlns:a16="http://schemas.microsoft.com/office/drawing/2014/main" id="{A2D7E8FA-BDA1-4B10-99E3-7A817C5A1634}"/>
-              </a:ext>
-            </a:extLst>
-          </p:cNvPr>
-          <p:cNvPicPr>
-            <a:picLocks noChangeAspect="1"/>
-          </p:cNvPicPr>
-          <p:nvPr/>
-        </p:nvPicPr>
-        <p:blipFill rotWithShape="1">
-          <a:blip r:embed="rId4">
-            <a:clrChange>
-              <a:clrFrom>
-                <a:srgbClr val="FFFFFF"/>
-              </a:clrFrom>
-              <a:clrTo>
-                <a:srgbClr val="FFFFFF">
-                  <a:alpha val="0"/>
-                </a:srgbClr>
-              </a:clrTo>
-            </a:clrChange>
-          </a:blip>
-          <a:srcRect r="10573"/>
-          <a:stretch/>
-        </p:blipFill>
-        <p:spPr>
-          <a:xfrm>
-            <a:off x="6145632" y="2755098"/>
-            <a:ext cx="442382" cy="711974"/>
-          </a:xfrm>
-          <a:prstGeom prst="rect">
-            <a:avLst/>
-          </a:prstGeom>
-        </p:spPr>
-      </p:pic>
-      <p:pic>
-        <p:nvPicPr>
-          <p:cNvPr id="16" name="Picture 15">
-            <a:extLst>
-              <a:ext uri="{FF2B5EF4-FFF2-40B4-BE49-F238E27FC236}">
-                <a16:creationId xmlns:a16="http://schemas.microsoft.com/office/drawing/2014/main" id="{40A4AFD2-34F3-46AA-9CDA-66124527A2E6}"/>
+          <p:cNvPr id="17" name="Picture 16">
+            <a:extLst>
+              <a:ext uri="{FF2B5EF4-FFF2-40B4-BE49-F238E27FC236}">
+                <a16:creationId xmlns:a16="http://schemas.microsoft.com/office/drawing/2014/main" id="{D8CE6332-EB93-4EFF-B4DF-077000CF3000}"/>
               </a:ext>
             </a:extLst>
           </p:cNvPr>
@@ -3717,9 +3717,9 @@
           </a:stretch>
         </p:blipFill>
         <p:spPr>
-          <a:xfrm>
-            <a:off x="1831477" y="1269028"/>
-            <a:ext cx="1073191" cy="541979"/>
+          <a:xfrm rot="16200000" flipH="1">
+            <a:off x="6691955" y="2620909"/>
+            <a:ext cx="444087" cy="1212057"/>
           </a:xfrm>
           <a:prstGeom prst="rect">
             <a:avLst/>
@@ -3728,10 +3728,10 @@
       </p:pic>
       <p:pic>
         <p:nvPicPr>
-          <p:cNvPr id="17" name="Picture 16">
-            <a:extLst>
-              <a:ext uri="{FF2B5EF4-FFF2-40B4-BE49-F238E27FC236}">
-                <a16:creationId xmlns:a16="http://schemas.microsoft.com/office/drawing/2014/main" id="{D8CE6332-EB93-4EFF-B4DF-077000CF3000}"/>
+          <p:cNvPr id="13" name="Picture 12">
+            <a:extLst>
+              <a:ext uri="{FF2B5EF4-FFF2-40B4-BE49-F238E27FC236}">
+                <a16:creationId xmlns:a16="http://schemas.microsoft.com/office/drawing/2014/main" id="{BF846594-0A0D-48D7-8D58-76DE97EFDBA3}"/>
               </a:ext>
             </a:extLst>
           </p:cNvPr>
@@ -3752,47 +3752,6 @@
                 </a:srgbClr>
               </a:clrTo>
             </a:clrChange>
-          </a:blip>
-          <a:stretch>
-            <a:fillRect/>
-          </a:stretch>
-        </p:blipFill>
-        <p:spPr>
-          <a:xfrm rot="16200000" flipH="1">
-            <a:off x="2215462" y="2624608"/>
-            <a:ext cx="444087" cy="1212057"/>
-          </a:xfrm>
-          <a:prstGeom prst="rect">
-            <a:avLst/>
-          </a:prstGeom>
-        </p:spPr>
-      </p:pic>
-      <p:pic>
-        <p:nvPicPr>
-          <p:cNvPr id="5" name="Picture 4">
-            <a:extLst>
-              <a:ext uri="{FF2B5EF4-FFF2-40B4-BE49-F238E27FC236}">
-                <a16:creationId xmlns:a16="http://schemas.microsoft.com/office/drawing/2014/main" id="{4A26FB9F-7041-4CD1-BA3D-474C496C6E4A}"/>
-              </a:ext>
-            </a:extLst>
-          </p:cNvPr>
-          <p:cNvPicPr>
-            <a:picLocks noChangeAspect="1"/>
-          </p:cNvPicPr>
-          <p:nvPr/>
-        </p:nvPicPr>
-        <p:blipFill>
-          <a:blip r:embed="rId7">
-            <a:clrChange>
-              <a:clrFrom>
-                <a:srgbClr val="FFFFFF"/>
-              </a:clrFrom>
-              <a:clrTo>
-                <a:srgbClr val="FFFFFF">
-                  <a:alpha val="0"/>
-                </a:srgbClr>
-              </a:clrTo>
-            </a:clrChange>
             <a:extLst>
               <a:ext uri="{28A0092B-C50C-407E-A947-70E740481C1C}">
                 <a14:useLocalDpi xmlns:a14="http://schemas.microsoft.com/office/drawing/2010/main" val="0"/>
@@ -3805,7 +3764,7 @@
         </p:blipFill>
         <p:spPr>
           <a:xfrm>
-            <a:off x="4204976" y="2240278"/>
+            <a:off x="4267196" y="3926160"/>
             <a:ext cx="1828804" cy="1188722"/>
           </a:xfrm>
           <a:prstGeom prst="rect">
@@ -3815,10 +3774,10 @@
       </p:pic>
       <p:pic>
         <p:nvPicPr>
-          <p:cNvPr id="9" name="Picture 8">
-            <a:extLst>
-              <a:ext uri="{FF2B5EF4-FFF2-40B4-BE49-F238E27FC236}">
-                <a16:creationId xmlns:a16="http://schemas.microsoft.com/office/drawing/2014/main" id="{890AF6CD-52FE-48A7-BE61-A0A894F2F198}"/>
+          <p:cNvPr id="7" name="Picture 6">
+            <a:extLst>
+              <a:ext uri="{FF2B5EF4-FFF2-40B4-BE49-F238E27FC236}">
+                <a16:creationId xmlns:a16="http://schemas.microsoft.com/office/drawing/2014/main" id="{91199093-F944-4E67-A9FB-B2F2DC33D70B}"/>
               </a:ext>
             </a:extLst>
           </p:cNvPr>
@@ -3828,17 +3787,7 @@
           <p:nvPr/>
         </p:nvPicPr>
         <p:blipFill>
-          <a:blip r:embed="rId8">
-            <a:clrChange>
-              <a:clrFrom>
-                <a:srgbClr val="FFFFFF"/>
-              </a:clrFrom>
-              <a:clrTo>
-                <a:srgbClr val="FFFFFF">
-                  <a:alpha val="0"/>
-                </a:srgbClr>
-              </a:clrTo>
-            </a:clrChange>
+          <a:blip r:embed="rId7">
             <a:extLst>
               <a:ext uri="{28A0092B-C50C-407E-A947-70E740481C1C}">
                 <a14:useLocalDpi xmlns:a14="http://schemas.microsoft.com/office/drawing/2010/main" val="0"/>
@@ -3851,7 +3800,7 @@
         </p:blipFill>
         <p:spPr>
           <a:xfrm>
-            <a:off x="8588941" y="622285"/>
+            <a:off x="4324654" y="2260259"/>
             <a:ext cx="1828804" cy="1188722"/>
           </a:xfrm>
           <a:prstGeom prst="rect">
@@ -3861,10 +3810,46 @@
       </p:pic>
       <p:pic>
         <p:nvPicPr>
-          <p:cNvPr id="11" name="Picture 10">
-            <a:extLst>
-              <a:ext uri="{FF2B5EF4-FFF2-40B4-BE49-F238E27FC236}">
-                <a16:creationId xmlns:a16="http://schemas.microsoft.com/office/drawing/2014/main" id="{A574DD98-EE91-4C3A-BE7D-C9FDAF728F4B}"/>
+          <p:cNvPr id="12" name="Picture 11">
+            <a:extLst>
+              <a:ext uri="{FF2B5EF4-FFF2-40B4-BE49-F238E27FC236}">
+                <a16:creationId xmlns:a16="http://schemas.microsoft.com/office/drawing/2014/main" id="{55D1B51B-C68F-4681-B610-2D1EDE746952}"/>
+              </a:ext>
+            </a:extLst>
+          </p:cNvPr>
+          <p:cNvPicPr>
+            <a:picLocks noChangeAspect="1"/>
+          </p:cNvPicPr>
+          <p:nvPr/>
+        </p:nvPicPr>
+        <p:blipFill>
+          <a:blip r:embed="rId8">
+            <a:extLst>
+              <a:ext uri="{28A0092B-C50C-407E-A947-70E740481C1C}">
+                <a14:useLocalDpi xmlns:a14="http://schemas.microsoft.com/office/drawing/2010/main" val="0"/>
+              </a:ext>
+            </a:extLst>
+          </a:blip>
+          <a:stretch>
+            <a:fillRect/>
+          </a:stretch>
+        </p:blipFill>
+        <p:spPr>
+          <a:xfrm>
+            <a:off x="8652767" y="3905451"/>
+            <a:ext cx="1828804" cy="1188722"/>
+          </a:xfrm>
+          <a:prstGeom prst="rect">
+            <a:avLst/>
+          </a:prstGeom>
+        </p:spPr>
+      </p:pic>
+      <p:pic>
+        <p:nvPicPr>
+          <p:cNvPr id="18" name="Picture 17">
+            <a:extLst>
+              <a:ext uri="{FF2B5EF4-FFF2-40B4-BE49-F238E27FC236}">
+                <a16:creationId xmlns:a16="http://schemas.microsoft.com/office/drawing/2014/main" id="{9E5BC0B3-BD8D-47B6-8DFF-8B7DA3367093}"/>
               </a:ext>
             </a:extLst>
           </p:cNvPr>
@@ -3897,7 +3882,7 @@
         </p:blipFill>
         <p:spPr>
           <a:xfrm>
-            <a:off x="4207313" y="554798"/>
+            <a:off x="4267196" y="594358"/>
             <a:ext cx="1828804" cy="1188722"/>
           </a:xfrm>
           <a:prstGeom prst="rect">
@@ -3907,10 +3892,10 @@
       </p:pic>
       <p:pic>
         <p:nvPicPr>
-          <p:cNvPr id="13" name="Picture 12">
-            <a:extLst>
-              <a:ext uri="{FF2B5EF4-FFF2-40B4-BE49-F238E27FC236}">
-                <a16:creationId xmlns:a16="http://schemas.microsoft.com/office/drawing/2014/main" id="{BF846594-0A0D-48D7-8D58-76DE97EFDBA3}"/>
+          <p:cNvPr id="23" name="Picture 22">
+            <a:extLst>
+              <a:ext uri="{FF2B5EF4-FFF2-40B4-BE49-F238E27FC236}">
+                <a16:creationId xmlns:a16="http://schemas.microsoft.com/office/drawing/2014/main" id="{B3CC4C02-5B2D-4EC6-8F57-71CACA4788D4}"/>
               </a:ext>
             </a:extLst>
           </p:cNvPr>
@@ -3921,16 +3906,6 @@
         </p:nvPicPr>
         <p:blipFill>
           <a:blip r:embed="rId10">
-            <a:clrChange>
-              <a:clrFrom>
-                <a:srgbClr val="FFFFFF"/>
-              </a:clrFrom>
-              <a:clrTo>
-                <a:srgbClr val="FFFFFF">
-                  <a:alpha val="0"/>
-                </a:srgbClr>
-              </a:clrTo>
-            </a:clrChange>
             <a:extLst>
               <a:ext uri="{28A0092B-C50C-407E-A947-70E740481C1C}">
                 <a14:useLocalDpi xmlns:a14="http://schemas.microsoft.com/office/drawing/2010/main" val="0"/>
@@ -3943,7 +3918,7 @@
         </p:blipFill>
         <p:spPr>
           <a:xfrm>
-            <a:off x="8588941" y="2237417"/>
+            <a:off x="8652767" y="2262813"/>
             <a:ext cx="1828804" cy="1188722"/>
           </a:xfrm>
           <a:prstGeom prst="rect">
@@ -3953,10 +3928,10 @@
       </p:pic>
       <p:pic>
         <p:nvPicPr>
-          <p:cNvPr id="19" name="Picture 18">
-            <a:extLst>
-              <a:ext uri="{FF2B5EF4-FFF2-40B4-BE49-F238E27FC236}">
-                <a16:creationId xmlns:a16="http://schemas.microsoft.com/office/drawing/2014/main" id="{D9F5D41C-13E8-4F6D-9933-2CA1093A32BD}"/>
+          <p:cNvPr id="25" name="Picture 24">
+            <a:extLst>
+              <a:ext uri="{FF2B5EF4-FFF2-40B4-BE49-F238E27FC236}">
+                <a16:creationId xmlns:a16="http://schemas.microsoft.com/office/drawing/2014/main" id="{5235AFD1-3B54-441E-BAE7-D74211F32AA0}"/>
               </a:ext>
             </a:extLst>
           </p:cNvPr>
@@ -3967,16 +3942,6 @@
         </p:nvPicPr>
         <p:blipFill>
           <a:blip r:embed="rId11">
-            <a:clrChange>
-              <a:clrFrom>
-                <a:srgbClr val="FFFFFF"/>
-              </a:clrFrom>
-              <a:clrTo>
-                <a:srgbClr val="FFFFFF">
-                  <a:alpha val="0"/>
-                </a:srgbClr>
-              </a:clrTo>
-            </a:clrChange>
             <a:extLst>
               <a:ext uri="{28A0092B-C50C-407E-A947-70E740481C1C}">
                 <a14:useLocalDpi xmlns:a14="http://schemas.microsoft.com/office/drawing/2010/main" val="0"/>
@@ -3989,95 +3954,8 @@
         </p:blipFill>
         <p:spPr>
           <a:xfrm>
-            <a:off x="8588941" y="3905451"/>
+            <a:off x="8652767" y="622285"/>
             <a:ext cx="1828804" cy="1188722"/>
-          </a:xfrm>
-          <a:prstGeom prst="rect">
-            <a:avLst/>
-          </a:prstGeom>
-        </p:spPr>
-      </p:pic>
-      <p:pic>
-        <p:nvPicPr>
-          <p:cNvPr id="21" name="Picture 20">
-            <a:extLst>
-              <a:ext uri="{FF2B5EF4-FFF2-40B4-BE49-F238E27FC236}">
-                <a16:creationId xmlns:a16="http://schemas.microsoft.com/office/drawing/2014/main" id="{8AAEDECD-7310-4282-8B9E-D614F01520D8}"/>
-              </a:ext>
-            </a:extLst>
-          </p:cNvPr>
-          <p:cNvPicPr>
-            <a:picLocks noChangeAspect="1"/>
-          </p:cNvPicPr>
-          <p:nvPr/>
-        </p:nvPicPr>
-        <p:blipFill>
-          <a:blip r:embed="rId12">
-            <a:clrChange>
-              <a:clrFrom>
-                <a:srgbClr val="FFFFFF"/>
-              </a:clrFrom>
-              <a:clrTo>
-                <a:srgbClr val="FFFFFF">
-                  <a:alpha val="0"/>
-                </a:srgbClr>
-              </a:clrTo>
-            </a:clrChange>
-            <a:extLst>
-              <a:ext uri="{28A0092B-C50C-407E-A947-70E740481C1C}">
-                <a14:useLocalDpi xmlns:a14="http://schemas.microsoft.com/office/drawing/2010/main" val="0"/>
-              </a:ext>
-            </a:extLst>
-          </a:blip>
-          <a:stretch>
-            <a:fillRect/>
-          </a:stretch>
-        </p:blipFill>
-        <p:spPr>
-          <a:xfrm>
-            <a:off x="4204976" y="3905451"/>
-            <a:ext cx="1828804" cy="1188722"/>
-          </a:xfrm>
-          <a:prstGeom prst="rect">
-            <a:avLst/>
-          </a:prstGeom>
-        </p:spPr>
-      </p:pic>
-      <p:pic>
-        <p:nvPicPr>
-          <p:cNvPr id="22" name="Picture 21">
-            <a:extLst>
-              <a:ext uri="{FF2B5EF4-FFF2-40B4-BE49-F238E27FC236}">
-                <a16:creationId xmlns:a16="http://schemas.microsoft.com/office/drawing/2014/main" id="{019CC013-E6E0-4E06-87B8-2BD7F2442BA4}"/>
-              </a:ext>
-            </a:extLst>
-          </p:cNvPr>
-          <p:cNvPicPr>
-            <a:picLocks noChangeAspect="1"/>
-          </p:cNvPicPr>
-          <p:nvPr/>
-        </p:nvPicPr>
-        <p:blipFill>
-          <a:blip r:embed="rId13">
-            <a:clrChange>
-              <a:clrFrom>
-                <a:srgbClr val="FFFFFF"/>
-              </a:clrFrom>
-              <a:clrTo>
-                <a:srgbClr val="FFFFFF">
-                  <a:alpha val="0"/>
-                </a:srgbClr>
-              </a:clrTo>
-            </a:clrChange>
-          </a:blip>
-          <a:stretch>
-            <a:fillRect/>
-          </a:stretch>
-        </p:blipFill>
-        <p:spPr>
-          <a:xfrm>
-            <a:off x="6168508" y="1149159"/>
-            <a:ext cx="896605" cy="614587"/>
           </a:xfrm>
           <a:prstGeom prst="rect">
             <a:avLst/>

</xml_diff>

<commit_message>
minor analysis and figure stuff
</commit_message>
<xml_diff>
--- a/Figures/figure_making.pptx
+++ b/Figures/figure_making.pptx
@@ -7,6 +7,9 @@
   <p:sldIdLst>
     <p:sldId id="256" r:id="rId2"/>
     <p:sldId id="257" r:id="rId3"/>
+    <p:sldId id="258" r:id="rId4"/>
+    <p:sldId id="259" r:id="rId5"/>
+    <p:sldId id="260" r:id="rId6"/>
   </p:sldIdLst>
   <p:sldSz cx="12192000" cy="6858000"/>
   <p:notesSz cx="6858000" cy="9144000"/>
@@ -260,7 +263,7 @@
           <a:p>
             <a:fld id="{9A0015C3-2E44-486C-A5F2-7FA6CB10593F}" type="datetimeFigureOut">
               <a:rPr lang="en-US" smtClean="0"/>
-              <a:t>9/21/2021</a:t>
+              <a:t>10/21/2021</a:t>
             </a:fld>
             <a:endParaRPr lang="en-US"/>
           </a:p>
@@ -458,7 +461,7 @@
           <a:p>
             <a:fld id="{9A0015C3-2E44-486C-A5F2-7FA6CB10593F}" type="datetimeFigureOut">
               <a:rPr lang="en-US" smtClean="0"/>
-              <a:t>9/21/2021</a:t>
+              <a:t>10/21/2021</a:t>
             </a:fld>
             <a:endParaRPr lang="en-US"/>
           </a:p>
@@ -666,7 +669,7 @@
           <a:p>
             <a:fld id="{9A0015C3-2E44-486C-A5F2-7FA6CB10593F}" type="datetimeFigureOut">
               <a:rPr lang="en-US" smtClean="0"/>
-              <a:t>9/21/2021</a:t>
+              <a:t>10/21/2021</a:t>
             </a:fld>
             <a:endParaRPr lang="en-US"/>
           </a:p>
@@ -864,7 +867,7 @@
           <a:p>
             <a:fld id="{9A0015C3-2E44-486C-A5F2-7FA6CB10593F}" type="datetimeFigureOut">
               <a:rPr lang="en-US" smtClean="0"/>
-              <a:t>9/21/2021</a:t>
+              <a:t>10/21/2021</a:t>
             </a:fld>
             <a:endParaRPr lang="en-US"/>
           </a:p>
@@ -1139,7 +1142,7 @@
           <a:p>
             <a:fld id="{9A0015C3-2E44-486C-A5F2-7FA6CB10593F}" type="datetimeFigureOut">
               <a:rPr lang="en-US" smtClean="0"/>
-              <a:t>9/21/2021</a:t>
+              <a:t>10/21/2021</a:t>
             </a:fld>
             <a:endParaRPr lang="en-US"/>
           </a:p>
@@ -1404,7 +1407,7 @@
           <a:p>
             <a:fld id="{9A0015C3-2E44-486C-A5F2-7FA6CB10593F}" type="datetimeFigureOut">
               <a:rPr lang="en-US" smtClean="0"/>
-              <a:t>9/21/2021</a:t>
+              <a:t>10/21/2021</a:t>
             </a:fld>
             <a:endParaRPr lang="en-US"/>
           </a:p>
@@ -1816,7 +1819,7 @@
           <a:p>
             <a:fld id="{9A0015C3-2E44-486C-A5F2-7FA6CB10593F}" type="datetimeFigureOut">
               <a:rPr lang="en-US" smtClean="0"/>
-              <a:t>9/21/2021</a:t>
+              <a:t>10/21/2021</a:t>
             </a:fld>
             <a:endParaRPr lang="en-US"/>
           </a:p>
@@ -1957,7 +1960,7 @@
           <a:p>
             <a:fld id="{9A0015C3-2E44-486C-A5F2-7FA6CB10593F}" type="datetimeFigureOut">
               <a:rPr lang="en-US" smtClean="0"/>
-              <a:t>9/21/2021</a:t>
+              <a:t>10/21/2021</a:t>
             </a:fld>
             <a:endParaRPr lang="en-US"/>
           </a:p>
@@ -2070,7 +2073,7 @@
           <a:p>
             <a:fld id="{9A0015C3-2E44-486C-A5F2-7FA6CB10593F}" type="datetimeFigureOut">
               <a:rPr lang="en-US" smtClean="0"/>
-              <a:t>9/21/2021</a:t>
+              <a:t>10/21/2021</a:t>
             </a:fld>
             <a:endParaRPr lang="en-US"/>
           </a:p>
@@ -2381,7 +2384,7 @@
           <a:p>
             <a:fld id="{9A0015C3-2E44-486C-A5F2-7FA6CB10593F}" type="datetimeFigureOut">
               <a:rPr lang="en-US" smtClean="0"/>
-              <a:t>9/21/2021</a:t>
+              <a:t>10/21/2021</a:t>
             </a:fld>
             <a:endParaRPr lang="en-US"/>
           </a:p>
@@ -2669,7 +2672,7 @@
           <a:p>
             <a:fld id="{9A0015C3-2E44-486C-A5F2-7FA6CB10593F}" type="datetimeFigureOut">
               <a:rPr lang="en-US" smtClean="0"/>
-              <a:t>9/21/2021</a:t>
+              <a:t>10/21/2021</a:t>
             </a:fld>
             <a:endParaRPr lang="en-US"/>
           </a:p>
@@ -2910,7 +2913,7 @@
           <a:p>
             <a:fld id="{9A0015C3-2E44-486C-A5F2-7FA6CB10593F}" type="datetimeFigureOut">
               <a:rPr lang="en-US" smtClean="0"/>
-              <a:t>9/21/2021</a:t>
+              <a:t>10/21/2021</a:t>
             </a:fld>
             <a:endParaRPr lang="en-US"/>
           </a:p>
@@ -3975,6 +3978,637 @@
 </p:sld>
 </file>
 
+<file path=ppt/slides/slide3.xml><?xml version="1.0" encoding="utf-8"?>
+<p:sld xmlns:a="http://schemas.openxmlformats.org/drawingml/2006/main" xmlns:r="http://schemas.openxmlformats.org/officeDocument/2006/relationships" xmlns:p="http://schemas.openxmlformats.org/presentationml/2006/main">
+  <p:cSld>
+    <p:spTree>
+      <p:nvGrpSpPr>
+        <p:cNvPr id="1" name=""/>
+        <p:cNvGrpSpPr/>
+        <p:nvPr/>
+      </p:nvGrpSpPr>
+      <p:grpSpPr>
+        <a:xfrm>
+          <a:off x="0" y="0"/>
+          <a:ext cx="0" cy="0"/>
+          <a:chOff x="0" y="0"/>
+          <a:chExt cx="0" cy="0"/>
+        </a:xfrm>
+      </p:grpSpPr>
+      <p:pic>
+        <p:nvPicPr>
+          <p:cNvPr id="5" name="Picture 4">
+            <a:extLst>
+              <a:ext uri="{FF2B5EF4-FFF2-40B4-BE49-F238E27FC236}">
+                <a16:creationId xmlns:a16="http://schemas.microsoft.com/office/drawing/2014/main" id="{9CDE8C2A-A629-4B71-A72D-7849C66DA06E}"/>
+              </a:ext>
+            </a:extLst>
+          </p:cNvPr>
+          <p:cNvPicPr>
+            <a:picLocks noChangeAspect="1"/>
+          </p:cNvPicPr>
+          <p:nvPr/>
+        </p:nvPicPr>
+        <p:blipFill>
+          <a:blip r:embed="rId2">
+            <a:extLst>
+              <a:ext uri="{28A0092B-C50C-407E-A947-70E740481C1C}">
+                <a14:useLocalDpi xmlns:a14="http://schemas.microsoft.com/office/drawing/2010/main" val="0"/>
+              </a:ext>
+            </a:extLst>
+          </a:blip>
+          <a:stretch>
+            <a:fillRect/>
+          </a:stretch>
+        </p:blipFill>
+        <p:spPr>
+          <a:xfrm>
+            <a:off x="2621273" y="640074"/>
+            <a:ext cx="6949454" cy="5577851"/>
+          </a:xfrm>
+          <a:prstGeom prst="rect">
+            <a:avLst/>
+          </a:prstGeom>
+        </p:spPr>
+      </p:pic>
+      <p:sp>
+        <p:nvSpPr>
+          <p:cNvPr id="6" name="Freeform: Shape 5">
+            <a:extLst>
+              <a:ext uri="{FF2B5EF4-FFF2-40B4-BE49-F238E27FC236}">
+                <a16:creationId xmlns:a16="http://schemas.microsoft.com/office/drawing/2014/main" id="{0E69B681-7AB7-4B1D-AE7D-4C715C1420AE}"/>
+              </a:ext>
+            </a:extLst>
+          </p:cNvPr>
+          <p:cNvSpPr/>
+          <p:nvPr/>
+        </p:nvSpPr>
+        <p:spPr>
+          <a:xfrm>
+            <a:off x="3154680" y="1380744"/>
+            <a:ext cx="6336792" cy="3913632"/>
+          </a:xfrm>
+          <a:custGeom>
+            <a:avLst/>
+            <a:gdLst>
+              <a:gd name="connsiteX0" fmla="*/ 0 w 6336792"/>
+              <a:gd name="connsiteY0" fmla="*/ 3776472 h 3913632"/>
+              <a:gd name="connsiteX1" fmla="*/ 9144 w 6336792"/>
+              <a:gd name="connsiteY1" fmla="*/ 3913632 h 3913632"/>
+              <a:gd name="connsiteX2" fmla="*/ 6336792 w 6336792"/>
+              <a:gd name="connsiteY2" fmla="*/ 3913632 h 3913632"/>
+              <a:gd name="connsiteX3" fmla="*/ 6327648 w 6336792"/>
+              <a:gd name="connsiteY3" fmla="*/ 0 h 3913632"/>
+              <a:gd name="connsiteX4" fmla="*/ 0 w 6336792"/>
+              <a:gd name="connsiteY4" fmla="*/ 3776472 h 3913632"/>
+            </a:gdLst>
+            <a:ahLst/>
+            <a:cxnLst>
+              <a:cxn ang="0">
+                <a:pos x="connsiteX0" y="connsiteY0"/>
+              </a:cxn>
+              <a:cxn ang="0">
+                <a:pos x="connsiteX1" y="connsiteY1"/>
+              </a:cxn>
+              <a:cxn ang="0">
+                <a:pos x="connsiteX2" y="connsiteY2"/>
+              </a:cxn>
+              <a:cxn ang="0">
+                <a:pos x="connsiteX3" y="connsiteY3"/>
+              </a:cxn>
+              <a:cxn ang="0">
+                <a:pos x="connsiteX4" y="connsiteY4"/>
+              </a:cxn>
+            </a:cxnLst>
+            <a:rect l="l" t="t" r="r" b="b"/>
+            <a:pathLst>
+              <a:path w="6336792" h="3913632">
+                <a:moveTo>
+                  <a:pt x="0" y="3776472"/>
+                </a:moveTo>
+                <a:lnTo>
+                  <a:pt x="9144" y="3913632"/>
+                </a:lnTo>
+                <a:lnTo>
+                  <a:pt x="6336792" y="3913632"/>
+                </a:lnTo>
+                <a:lnTo>
+                  <a:pt x="6327648" y="0"/>
+                </a:lnTo>
+                <a:lnTo>
+                  <a:pt x="0" y="3776472"/>
+                </a:lnTo>
+                <a:close/>
+              </a:path>
+            </a:pathLst>
+          </a:custGeom>
+          <a:solidFill>
+            <a:srgbClr val="FF0000">
+              <a:alpha val="25000"/>
+            </a:srgbClr>
+          </a:solidFill>
+        </p:spPr>
+        <p:style>
+          <a:lnRef idx="2">
+            <a:schemeClr val="accent1">
+              <a:shade val="50000"/>
+            </a:schemeClr>
+          </a:lnRef>
+          <a:fillRef idx="1">
+            <a:schemeClr val="accent1"/>
+          </a:fillRef>
+          <a:effectRef idx="0">
+            <a:schemeClr val="accent1"/>
+          </a:effectRef>
+          <a:fontRef idx="minor">
+            <a:schemeClr val="lt1"/>
+          </a:fontRef>
+        </p:style>
+        <p:txBody>
+          <a:bodyPr rtlCol="0" anchor="ctr"/>
+          <a:lstStyle/>
+          <a:p>
+            <a:pPr algn="ctr"/>
+            <a:endParaRPr lang="en-US"/>
+          </a:p>
+        </p:txBody>
+      </p:sp>
+      <p:sp>
+        <p:nvSpPr>
+          <p:cNvPr id="8" name="Freeform: Shape 7">
+            <a:extLst>
+              <a:ext uri="{FF2B5EF4-FFF2-40B4-BE49-F238E27FC236}">
+                <a16:creationId xmlns:a16="http://schemas.microsoft.com/office/drawing/2014/main" id="{BE864A6F-095C-4389-9D6B-B97B6F6F8491}"/>
+              </a:ext>
+            </a:extLst>
+          </p:cNvPr>
+          <p:cNvSpPr/>
+          <p:nvPr/>
+        </p:nvSpPr>
+        <p:spPr>
+          <a:xfrm>
+            <a:off x="3158836" y="720436"/>
+            <a:ext cx="6326909" cy="4405746"/>
+          </a:xfrm>
+          <a:custGeom>
+            <a:avLst/>
+            <a:gdLst>
+              <a:gd name="connsiteX0" fmla="*/ 0 w 6326909"/>
+              <a:gd name="connsiteY0" fmla="*/ 0 h 4405746"/>
+              <a:gd name="connsiteX1" fmla="*/ 6317673 w 6326909"/>
+              <a:gd name="connsiteY1" fmla="*/ 0 h 4405746"/>
+              <a:gd name="connsiteX2" fmla="*/ 6326909 w 6326909"/>
+              <a:gd name="connsiteY2" fmla="*/ 600364 h 4405746"/>
+              <a:gd name="connsiteX3" fmla="*/ 0 w 6326909"/>
+              <a:gd name="connsiteY3" fmla="*/ 4405746 h 4405746"/>
+              <a:gd name="connsiteX4" fmla="*/ 0 w 6326909"/>
+              <a:gd name="connsiteY4" fmla="*/ 0 h 4405746"/>
+            </a:gdLst>
+            <a:ahLst/>
+            <a:cxnLst>
+              <a:cxn ang="0">
+                <a:pos x="connsiteX0" y="connsiteY0"/>
+              </a:cxn>
+              <a:cxn ang="0">
+                <a:pos x="connsiteX1" y="connsiteY1"/>
+              </a:cxn>
+              <a:cxn ang="0">
+                <a:pos x="connsiteX2" y="connsiteY2"/>
+              </a:cxn>
+              <a:cxn ang="0">
+                <a:pos x="connsiteX3" y="connsiteY3"/>
+              </a:cxn>
+              <a:cxn ang="0">
+                <a:pos x="connsiteX4" y="connsiteY4"/>
+              </a:cxn>
+            </a:cxnLst>
+            <a:rect l="l" t="t" r="r" b="b"/>
+            <a:pathLst>
+              <a:path w="6326909" h="4405746">
+                <a:moveTo>
+                  <a:pt x="0" y="0"/>
+                </a:moveTo>
+                <a:lnTo>
+                  <a:pt x="6317673" y="0"/>
+                </a:lnTo>
+                <a:lnTo>
+                  <a:pt x="6326909" y="600364"/>
+                </a:lnTo>
+                <a:lnTo>
+                  <a:pt x="0" y="4405746"/>
+                </a:lnTo>
+                <a:lnTo>
+                  <a:pt x="0" y="0"/>
+                </a:lnTo>
+                <a:close/>
+              </a:path>
+            </a:pathLst>
+          </a:custGeom>
+          <a:solidFill>
+            <a:schemeClr val="accent1">
+              <a:alpha val="25000"/>
+            </a:schemeClr>
+          </a:solidFill>
+        </p:spPr>
+        <p:style>
+          <a:lnRef idx="2">
+            <a:schemeClr val="accent1">
+              <a:shade val="50000"/>
+            </a:schemeClr>
+          </a:lnRef>
+          <a:fillRef idx="1">
+            <a:schemeClr val="accent1"/>
+          </a:fillRef>
+          <a:effectRef idx="0">
+            <a:schemeClr val="accent1"/>
+          </a:effectRef>
+          <a:fontRef idx="minor">
+            <a:schemeClr val="lt1"/>
+          </a:fontRef>
+        </p:style>
+        <p:txBody>
+          <a:bodyPr rtlCol="0" anchor="ctr"/>
+          <a:lstStyle/>
+          <a:p>
+            <a:pPr algn="ctr"/>
+            <a:endParaRPr lang="en-US"/>
+          </a:p>
+        </p:txBody>
+      </p:sp>
+    </p:spTree>
+    <p:extLst>
+      <p:ext uri="{BB962C8B-B14F-4D97-AF65-F5344CB8AC3E}">
+        <p14:creationId xmlns:p14="http://schemas.microsoft.com/office/powerpoint/2010/main" val="2494750978"/>
+      </p:ext>
+    </p:extLst>
+  </p:cSld>
+  <p:clrMapOvr>
+    <a:masterClrMapping/>
+  </p:clrMapOvr>
+</p:sld>
+</file>
+
+<file path=ppt/slides/slide4.xml><?xml version="1.0" encoding="utf-8"?>
+<p:sld xmlns:a="http://schemas.openxmlformats.org/drawingml/2006/main" xmlns:r="http://schemas.openxmlformats.org/officeDocument/2006/relationships" xmlns:p="http://schemas.openxmlformats.org/presentationml/2006/main">
+  <p:cSld>
+    <p:spTree>
+      <p:nvGrpSpPr>
+        <p:cNvPr id="1" name=""/>
+        <p:cNvGrpSpPr/>
+        <p:nvPr/>
+      </p:nvGrpSpPr>
+      <p:grpSpPr>
+        <a:xfrm>
+          <a:off x="0" y="0"/>
+          <a:ext cx="0" cy="0"/>
+          <a:chOff x="0" y="0"/>
+          <a:chExt cx="0" cy="0"/>
+        </a:xfrm>
+      </p:grpSpPr>
+      <p:pic>
+        <p:nvPicPr>
+          <p:cNvPr id="3" name="Picture 2">
+            <a:extLst>
+              <a:ext uri="{FF2B5EF4-FFF2-40B4-BE49-F238E27FC236}">
+                <a16:creationId xmlns:a16="http://schemas.microsoft.com/office/drawing/2014/main" id="{1674548D-CDC4-4B1E-955D-0800966F4CFC}"/>
+              </a:ext>
+            </a:extLst>
+          </p:cNvPr>
+          <p:cNvPicPr>
+            <a:picLocks noChangeAspect="1"/>
+          </p:cNvPicPr>
+          <p:nvPr/>
+        </p:nvPicPr>
+        <p:blipFill rotWithShape="1">
+          <a:blip r:embed="rId2">
+            <a:extLst>
+              <a:ext uri="{28A0092B-C50C-407E-A947-70E740481C1C}">
+                <a14:useLocalDpi xmlns:a14="http://schemas.microsoft.com/office/drawing/2010/main" val="0"/>
+              </a:ext>
+            </a:extLst>
+          </a:blip>
+          <a:srcRect l="61829" t="33897" r="22754" b="62625"/>
+          <a:stretch/>
+        </p:blipFill>
+        <p:spPr>
+          <a:xfrm>
+            <a:off x="6918036" y="2530764"/>
+            <a:ext cx="1071420" cy="193963"/>
+          </a:xfrm>
+          <a:prstGeom prst="rect">
+            <a:avLst/>
+          </a:prstGeom>
+        </p:spPr>
+      </p:pic>
+    </p:spTree>
+    <p:extLst>
+      <p:ext uri="{BB962C8B-B14F-4D97-AF65-F5344CB8AC3E}">
+        <p14:creationId xmlns:p14="http://schemas.microsoft.com/office/powerpoint/2010/main" val="932018249"/>
+      </p:ext>
+    </p:extLst>
+  </p:cSld>
+  <p:clrMapOvr>
+    <a:masterClrMapping/>
+  </p:clrMapOvr>
+</p:sld>
+</file>
+
+<file path=ppt/slides/slide5.xml><?xml version="1.0" encoding="utf-8"?>
+<p:sld xmlns:a="http://schemas.openxmlformats.org/drawingml/2006/main" xmlns:r="http://schemas.openxmlformats.org/officeDocument/2006/relationships" xmlns:p="http://schemas.openxmlformats.org/presentationml/2006/main">
+  <p:cSld>
+    <p:spTree>
+      <p:nvGrpSpPr>
+        <p:cNvPr id="1" name=""/>
+        <p:cNvGrpSpPr/>
+        <p:nvPr/>
+      </p:nvGrpSpPr>
+      <p:grpSpPr>
+        <a:xfrm>
+          <a:off x="0" y="0"/>
+          <a:ext cx="0" cy="0"/>
+          <a:chOff x="0" y="0"/>
+          <a:chExt cx="0" cy="0"/>
+        </a:xfrm>
+      </p:grpSpPr>
+      <p:sp>
+        <p:nvSpPr>
+          <p:cNvPr id="4" name="Freeform: Shape 3">
+            <a:extLst>
+              <a:ext uri="{FF2B5EF4-FFF2-40B4-BE49-F238E27FC236}">
+                <a16:creationId xmlns:a16="http://schemas.microsoft.com/office/drawing/2014/main" id="{33DD9314-3B6F-495A-A294-ED0DBFC08E7D}"/>
+              </a:ext>
+            </a:extLst>
+          </p:cNvPr>
+          <p:cNvSpPr/>
+          <p:nvPr/>
+        </p:nvSpPr>
+        <p:spPr>
+          <a:xfrm>
+            <a:off x="3149600" y="730250"/>
+            <a:ext cx="6337300" cy="4413250"/>
+          </a:xfrm>
+          <a:custGeom>
+            <a:avLst/>
+            <a:gdLst>
+              <a:gd name="connsiteX0" fmla="*/ 6350 w 6337300"/>
+              <a:gd name="connsiteY0" fmla="*/ 0 h 4413250"/>
+              <a:gd name="connsiteX1" fmla="*/ 6337300 w 6337300"/>
+              <a:gd name="connsiteY1" fmla="*/ 0 h 4413250"/>
+              <a:gd name="connsiteX2" fmla="*/ 6337300 w 6337300"/>
+              <a:gd name="connsiteY2" fmla="*/ 615950 h 4413250"/>
+              <a:gd name="connsiteX3" fmla="*/ 0 w 6337300"/>
+              <a:gd name="connsiteY3" fmla="*/ 4413250 h 4413250"/>
+              <a:gd name="connsiteX4" fmla="*/ 6350 w 6337300"/>
+              <a:gd name="connsiteY4" fmla="*/ 0 h 4413250"/>
+            </a:gdLst>
+            <a:ahLst/>
+            <a:cxnLst>
+              <a:cxn ang="0">
+                <a:pos x="connsiteX0" y="connsiteY0"/>
+              </a:cxn>
+              <a:cxn ang="0">
+                <a:pos x="connsiteX1" y="connsiteY1"/>
+              </a:cxn>
+              <a:cxn ang="0">
+                <a:pos x="connsiteX2" y="connsiteY2"/>
+              </a:cxn>
+              <a:cxn ang="0">
+                <a:pos x="connsiteX3" y="connsiteY3"/>
+              </a:cxn>
+              <a:cxn ang="0">
+                <a:pos x="connsiteX4" y="connsiteY4"/>
+              </a:cxn>
+            </a:cxnLst>
+            <a:rect l="l" t="t" r="r" b="b"/>
+            <a:pathLst>
+              <a:path w="6337300" h="4413250">
+                <a:moveTo>
+                  <a:pt x="6350" y="0"/>
+                </a:moveTo>
+                <a:lnTo>
+                  <a:pt x="6337300" y="0"/>
+                </a:lnTo>
+                <a:lnTo>
+                  <a:pt x="6337300" y="615950"/>
+                </a:lnTo>
+                <a:lnTo>
+                  <a:pt x="0" y="4413250"/>
+                </a:lnTo>
+                <a:cubicBezTo>
+                  <a:pt x="4233" y="2946400"/>
+                  <a:pt x="8467" y="1479550"/>
+                  <a:pt x="6350" y="0"/>
+                </a:cubicBezTo>
+                <a:close/>
+              </a:path>
+            </a:pathLst>
+          </a:custGeom>
+          <a:solidFill>
+            <a:srgbClr val="F02F00">
+              <a:alpha val="40000"/>
+            </a:srgbClr>
+          </a:solidFill>
+          <a:ln>
+            <a:solidFill>
+              <a:srgbClr val="F02F00">
+                <a:alpha val="40000"/>
+              </a:srgbClr>
+            </a:solidFill>
+          </a:ln>
+        </p:spPr>
+        <p:style>
+          <a:lnRef idx="2">
+            <a:schemeClr val="accent1">
+              <a:shade val="50000"/>
+            </a:schemeClr>
+          </a:lnRef>
+          <a:fillRef idx="1">
+            <a:schemeClr val="accent1"/>
+          </a:fillRef>
+          <a:effectRef idx="0">
+            <a:schemeClr val="accent1"/>
+          </a:effectRef>
+          <a:fontRef idx="minor">
+            <a:schemeClr val="lt1"/>
+          </a:fontRef>
+        </p:style>
+        <p:txBody>
+          <a:bodyPr rtlCol="0" anchor="ctr"/>
+          <a:lstStyle/>
+          <a:p>
+            <a:pPr algn="ctr"/>
+            <a:endParaRPr lang="en-US"/>
+          </a:p>
+        </p:txBody>
+      </p:sp>
+      <p:sp>
+        <p:nvSpPr>
+          <p:cNvPr id="7" name="Freeform: Shape 6">
+            <a:extLst>
+              <a:ext uri="{FF2B5EF4-FFF2-40B4-BE49-F238E27FC236}">
+                <a16:creationId xmlns:a16="http://schemas.microsoft.com/office/drawing/2014/main" id="{CB9878E4-FD1C-408F-BE58-30E8E450F0E6}"/>
+              </a:ext>
+            </a:extLst>
+          </p:cNvPr>
+          <p:cNvSpPr/>
+          <p:nvPr/>
+        </p:nvSpPr>
+        <p:spPr>
+          <a:xfrm>
+            <a:off x="3136900" y="1358900"/>
+            <a:ext cx="6350000" cy="3937000"/>
+          </a:xfrm>
+          <a:custGeom>
+            <a:avLst/>
+            <a:gdLst>
+              <a:gd name="connsiteX0" fmla="*/ 6350000 w 6350000"/>
+              <a:gd name="connsiteY0" fmla="*/ 0 h 3937000"/>
+              <a:gd name="connsiteX1" fmla="*/ 6350000 w 6350000"/>
+              <a:gd name="connsiteY1" fmla="*/ 3937000 h 3937000"/>
+              <a:gd name="connsiteX2" fmla="*/ 0 w 6350000"/>
+              <a:gd name="connsiteY2" fmla="*/ 3937000 h 3937000"/>
+              <a:gd name="connsiteX3" fmla="*/ 12700 w 6350000"/>
+              <a:gd name="connsiteY3" fmla="*/ 3803650 h 3937000"/>
+              <a:gd name="connsiteX4" fmla="*/ 6350000 w 6350000"/>
+              <a:gd name="connsiteY4" fmla="*/ 0 h 3937000"/>
+            </a:gdLst>
+            <a:ahLst/>
+            <a:cxnLst>
+              <a:cxn ang="0">
+                <a:pos x="connsiteX0" y="connsiteY0"/>
+              </a:cxn>
+              <a:cxn ang="0">
+                <a:pos x="connsiteX1" y="connsiteY1"/>
+              </a:cxn>
+              <a:cxn ang="0">
+                <a:pos x="connsiteX2" y="connsiteY2"/>
+              </a:cxn>
+              <a:cxn ang="0">
+                <a:pos x="connsiteX3" y="connsiteY3"/>
+              </a:cxn>
+              <a:cxn ang="0">
+                <a:pos x="connsiteX4" y="connsiteY4"/>
+              </a:cxn>
+            </a:cxnLst>
+            <a:rect l="l" t="t" r="r" b="b"/>
+            <a:pathLst>
+              <a:path w="6350000" h="3937000">
+                <a:moveTo>
+                  <a:pt x="6350000" y="0"/>
+                </a:moveTo>
+                <a:lnTo>
+                  <a:pt x="6350000" y="3937000"/>
+                </a:lnTo>
+                <a:lnTo>
+                  <a:pt x="0" y="3937000"/>
+                </a:lnTo>
+                <a:lnTo>
+                  <a:pt x="12700" y="3803650"/>
+                </a:lnTo>
+                <a:lnTo>
+                  <a:pt x="6350000" y="0"/>
+                </a:lnTo>
+                <a:close/>
+              </a:path>
+            </a:pathLst>
+          </a:custGeom>
+          <a:solidFill>
+            <a:srgbClr val="55A7BA">
+              <a:alpha val="40000"/>
+            </a:srgbClr>
+          </a:solidFill>
+          <a:ln>
+            <a:solidFill>
+              <a:srgbClr val="55A7BA">
+                <a:alpha val="40000"/>
+              </a:srgbClr>
+            </a:solidFill>
+          </a:ln>
+        </p:spPr>
+        <p:style>
+          <a:lnRef idx="2">
+            <a:schemeClr val="accent1">
+              <a:shade val="50000"/>
+            </a:schemeClr>
+          </a:lnRef>
+          <a:fillRef idx="1">
+            <a:schemeClr val="accent1"/>
+          </a:fillRef>
+          <a:effectRef idx="0">
+            <a:schemeClr val="accent1"/>
+          </a:effectRef>
+          <a:fontRef idx="minor">
+            <a:schemeClr val="lt1"/>
+          </a:fontRef>
+        </p:style>
+        <p:txBody>
+          <a:bodyPr rtlCol="0" anchor="ctr"/>
+          <a:lstStyle/>
+          <a:p>
+            <a:pPr algn="ctr"/>
+            <a:endParaRPr lang="en-US"/>
+          </a:p>
+        </p:txBody>
+      </p:sp>
+      <p:pic>
+        <p:nvPicPr>
+          <p:cNvPr id="3" name="Picture 2">
+            <a:extLst>
+              <a:ext uri="{FF2B5EF4-FFF2-40B4-BE49-F238E27FC236}">
+                <a16:creationId xmlns:a16="http://schemas.microsoft.com/office/drawing/2014/main" id="{1674548D-CDC4-4B1E-955D-0800966F4CFC}"/>
+              </a:ext>
+            </a:extLst>
+          </p:cNvPr>
+          <p:cNvPicPr>
+            <a:picLocks noChangeAspect="1"/>
+          </p:cNvPicPr>
+          <p:nvPr/>
+        </p:nvPicPr>
+        <p:blipFill>
+          <a:blip r:embed="rId2">
+            <a:clrChange>
+              <a:clrFrom>
+                <a:srgbClr val="FFFFFF"/>
+              </a:clrFrom>
+              <a:clrTo>
+                <a:srgbClr val="FFFFFF">
+                  <a:alpha val="0"/>
+                </a:srgbClr>
+              </a:clrTo>
+            </a:clrChange>
+            <a:extLst>
+              <a:ext uri="{28A0092B-C50C-407E-A947-70E740481C1C}">
+                <a14:useLocalDpi xmlns:a14="http://schemas.microsoft.com/office/drawing/2010/main" val="0"/>
+              </a:ext>
+            </a:extLst>
+          </a:blip>
+          <a:stretch>
+            <a:fillRect/>
+          </a:stretch>
+        </p:blipFill>
+        <p:spPr>
+          <a:xfrm>
+            <a:off x="2621273" y="640074"/>
+            <a:ext cx="6949454" cy="5577851"/>
+          </a:xfrm>
+          <a:prstGeom prst="rect">
+            <a:avLst/>
+          </a:prstGeom>
+        </p:spPr>
+      </p:pic>
+    </p:spTree>
+    <p:extLst>
+      <p:ext uri="{BB962C8B-B14F-4D97-AF65-F5344CB8AC3E}">
+        <p14:creationId xmlns:p14="http://schemas.microsoft.com/office/powerpoint/2010/main" val="1134530135"/>
+      </p:ext>
+    </p:extLst>
+  </p:cSld>
+  <p:clrMapOvr>
+    <a:masterClrMapping/>
+  </p:clrMapOvr>
+</p:sld>
+</file>
+
 <file path=ppt/theme/theme1.xml><?xml version="1.0" encoding="utf-8"?>
 <a:theme xmlns:a="http://schemas.openxmlformats.org/drawingml/2006/main" name="Office Theme">
   <a:themeElements>

</xml_diff>